<commit_message>
update chapter 3 ppt
</commit_message>
<xml_diff>
--- a/ppt/Practical Statistics for Data science_Chapter3.pptx
+++ b/ppt/Practical Statistics for Data science_Chapter3.pptx
@@ -1058,6 +1058,13 @@
         </dgm:presLayoutVars>
       </dgm:prSet>
       <dgm:spPr/>
+      <dgm:t>
+        <a:bodyPr/>
+        <a:lstStyle/>
+        <a:p>
+          <a:endParaRPr lang="en-US"/>
+        </a:p>
+      </dgm:t>
     </dgm:pt>
     <dgm:pt modelId="{29FB1EAF-31B5-4CCF-827A-E173A4B889C0}" type="pres">
       <dgm:prSet presAssocID="{7B682395-7466-4909-8F99-840AB13FE3DD}" presName="parTxOnlySpace" presStyleCnt="0"/>
@@ -1072,6 +1079,13 @@
         </dgm:presLayoutVars>
       </dgm:prSet>
       <dgm:spPr/>
+      <dgm:t>
+        <a:bodyPr/>
+        <a:lstStyle/>
+        <a:p>
+          <a:endParaRPr lang="en-US"/>
+        </a:p>
+      </dgm:t>
     </dgm:pt>
     <dgm:pt modelId="{E2115448-C61F-4A30-B2F8-391076F7118B}" type="pres">
       <dgm:prSet presAssocID="{DE5A0AC7-47BF-4A01-A735-764E004C58EF}" presName="parTxOnlySpace" presStyleCnt="0"/>
@@ -1086,6 +1100,13 @@
         </dgm:presLayoutVars>
       </dgm:prSet>
       <dgm:spPr/>
+      <dgm:t>
+        <a:bodyPr/>
+        <a:lstStyle/>
+        <a:p>
+          <a:endParaRPr lang="en-US"/>
+        </a:p>
+      </dgm:t>
     </dgm:pt>
     <dgm:pt modelId="{BC0B2DC1-6821-4E0D-AB53-233726317002}" type="pres">
       <dgm:prSet presAssocID="{C0DC4562-AAFA-42D0-AE04-DEACF0188AE6}" presName="parTxOnlySpace" presStyleCnt="0"/>
@@ -1100,18 +1121,25 @@
         </dgm:presLayoutVars>
       </dgm:prSet>
       <dgm:spPr/>
+      <dgm:t>
+        <a:bodyPr/>
+        <a:lstStyle/>
+        <a:p>
+          <a:endParaRPr lang="en-US"/>
+        </a:p>
+      </dgm:t>
     </dgm:pt>
   </dgm:ptLst>
   <dgm:cxnLst>
+    <dgm:cxn modelId="{8192528B-D73C-449C-88D3-C8D57BB7DE47}" srcId="{96DD7E66-90D0-4628-A2B9-F3ACFA9EDE2F}" destId="{B850015C-CD69-467C-974C-5A624FD12258}" srcOrd="0" destOrd="0" parTransId="{A8A3E7C2-6140-469B-85CB-171E526CC81F}" sibTransId="{7B682395-7466-4909-8F99-840AB13FE3DD}"/>
     <dgm:cxn modelId="{AB38EF25-E6BE-4609-8E34-8F429821598F}" srcId="{96DD7E66-90D0-4628-A2B9-F3ACFA9EDE2F}" destId="{FBBD5157-372D-48FB-BC50-E1803DF64FC8}" srcOrd="2" destOrd="0" parTransId="{A9D8567D-3A8E-49DA-AB22-30C234C12519}" sibTransId="{C0DC4562-AAFA-42D0-AE04-DEACF0188AE6}"/>
+    <dgm:cxn modelId="{DE876AAE-C16B-4193-B7E7-B194E6DC30FE}" type="presOf" srcId="{B850015C-CD69-467C-974C-5A624FD12258}" destId="{21CA0705-37BF-4420-B0BC-9FD140AB8E53}" srcOrd="0" destOrd="0" presId="urn:microsoft.com/office/officeart/2005/8/layout/chevron1"/>
     <dgm:cxn modelId="{93D08C26-19D2-4F68-A5CE-8EB270472C16}" srcId="{96DD7E66-90D0-4628-A2B9-F3ACFA9EDE2F}" destId="{F0C53062-30D0-4352-878F-976455D161A3}" srcOrd="1" destOrd="0" parTransId="{6804605F-35C2-40DE-B916-02A877E16EC1}" sibTransId="{DE5A0AC7-47BF-4A01-A735-764E004C58EF}"/>
+    <dgm:cxn modelId="{3B7063EF-E941-4BA0-B611-F05A4FE5E12D}" type="presOf" srcId="{F0C53062-30D0-4352-878F-976455D161A3}" destId="{F502020B-2D78-4129-8914-F1293F7BCB75}" srcOrd="0" destOrd="0" presId="urn:microsoft.com/office/officeart/2005/8/layout/chevron1"/>
     <dgm:cxn modelId="{9BF14B42-3BD4-42A3-9900-1F63E1C7BC71}" srcId="{96DD7E66-90D0-4628-A2B9-F3ACFA9EDE2F}" destId="{B163B9A2-5175-4760-BC4E-CBF9928BC3D4}" srcOrd="3" destOrd="0" parTransId="{B7352EC8-1843-4069-996F-95B889D93617}" sibTransId="{3EB8D310-6EB3-4984-91C0-BFC6251B8FD7}"/>
-    <dgm:cxn modelId="{8192528B-D73C-449C-88D3-C8D57BB7DE47}" srcId="{96DD7E66-90D0-4628-A2B9-F3ACFA9EDE2F}" destId="{B850015C-CD69-467C-974C-5A624FD12258}" srcOrd="0" destOrd="0" parTransId="{A8A3E7C2-6140-469B-85CB-171E526CC81F}" sibTransId="{7B682395-7466-4909-8F99-840AB13FE3DD}"/>
-    <dgm:cxn modelId="{948D1FA2-19A7-4790-A6CC-87E96D9F109F}" type="presOf" srcId="{B163B9A2-5175-4760-BC4E-CBF9928BC3D4}" destId="{1E8B0D82-AF9D-4547-BB00-E99FD79CD450}" srcOrd="0" destOrd="0" presId="urn:microsoft.com/office/officeart/2005/8/layout/chevron1"/>
-    <dgm:cxn modelId="{DE876AAE-C16B-4193-B7E7-B194E6DC30FE}" type="presOf" srcId="{B850015C-CD69-467C-974C-5A624FD12258}" destId="{21CA0705-37BF-4420-B0BC-9FD140AB8E53}" srcOrd="0" destOrd="0" presId="urn:microsoft.com/office/officeart/2005/8/layout/chevron1"/>
     <dgm:cxn modelId="{2AF561BD-BBDC-49C2-9654-05837AC752F6}" type="presOf" srcId="{FBBD5157-372D-48FB-BC50-E1803DF64FC8}" destId="{85B059EF-19FD-4600-8E3C-715963F1FC07}" srcOrd="0" destOrd="0" presId="urn:microsoft.com/office/officeart/2005/8/layout/chevron1"/>
     <dgm:cxn modelId="{F822B3DF-A371-4820-90E0-A89F3D4FE859}" type="presOf" srcId="{96DD7E66-90D0-4628-A2B9-F3ACFA9EDE2F}" destId="{14BE4270-3CCC-42DD-ABA8-5F9EBD196624}" srcOrd="0" destOrd="0" presId="urn:microsoft.com/office/officeart/2005/8/layout/chevron1"/>
-    <dgm:cxn modelId="{3B7063EF-E941-4BA0-B611-F05A4FE5E12D}" type="presOf" srcId="{F0C53062-30D0-4352-878F-976455D161A3}" destId="{F502020B-2D78-4129-8914-F1293F7BCB75}" srcOrd="0" destOrd="0" presId="urn:microsoft.com/office/officeart/2005/8/layout/chevron1"/>
+    <dgm:cxn modelId="{948D1FA2-19A7-4790-A6CC-87E96D9F109F}" type="presOf" srcId="{B163B9A2-5175-4760-BC4E-CBF9928BC3D4}" destId="{1E8B0D82-AF9D-4547-BB00-E99FD79CD450}" srcOrd="0" destOrd="0" presId="urn:microsoft.com/office/officeart/2005/8/layout/chevron1"/>
     <dgm:cxn modelId="{822E5A27-3810-4960-8C3B-41FD49EAD067}" type="presParOf" srcId="{14BE4270-3CCC-42DD-ABA8-5F9EBD196624}" destId="{21CA0705-37BF-4420-B0BC-9FD140AB8E53}" srcOrd="0" destOrd="0" presId="urn:microsoft.com/office/officeart/2005/8/layout/chevron1"/>
     <dgm:cxn modelId="{C4B7327C-157B-4814-AA31-AA3FEB7D2239}" type="presParOf" srcId="{14BE4270-3CCC-42DD-ABA8-5F9EBD196624}" destId="{29FB1EAF-31B5-4CCF-827A-E173A4B889C0}" srcOrd="1" destOrd="0" presId="urn:microsoft.com/office/officeart/2005/8/layout/chevron1"/>
     <dgm:cxn modelId="{1F159649-5F27-4408-95C5-4858514807E6}" type="presParOf" srcId="{14BE4270-3CCC-42DD-ABA8-5F9EBD196624}" destId="{F502020B-2D78-4129-8914-F1293F7BCB75}" srcOrd="2" destOrd="0" presId="urn:microsoft.com/office/officeart/2005/8/layout/chevron1"/>
@@ -1187,7 +1215,7 @@
         </a:bodyPr>
         <a:lstStyle/>
         <a:p>
-          <a:pPr marL="0" lvl="0" indent="0" algn="ctr" defTabSz="889000">
+          <a:pPr lvl="0" algn="ctr" defTabSz="889000">
             <a:lnSpc>
               <a:spcPct val="90000"/>
             </a:lnSpc>
@@ -1197,7 +1225,6 @@
             <a:spcAft>
               <a:spcPct val="35000"/>
             </a:spcAft>
-            <a:buNone/>
           </a:pPr>
           <a:r>
             <a:rPr lang="en-US" sz="2000" kern="1200" dirty="0"/>
@@ -1260,7 +1287,7 @@
         </a:bodyPr>
         <a:lstStyle/>
         <a:p>
-          <a:pPr marL="0" lvl="0" indent="0" algn="ctr" defTabSz="889000">
+          <a:pPr lvl="0" algn="ctr" defTabSz="889000">
             <a:lnSpc>
               <a:spcPct val="90000"/>
             </a:lnSpc>
@@ -1270,7 +1297,6 @@
             <a:spcAft>
               <a:spcPct val="35000"/>
             </a:spcAft>
-            <a:buNone/>
           </a:pPr>
           <a:r>
             <a:rPr lang="en-US" sz="2000" kern="1200" dirty="0"/>
@@ -1333,7 +1359,7 @@
         </a:bodyPr>
         <a:lstStyle/>
         <a:p>
-          <a:pPr marL="0" lvl="0" indent="0" algn="ctr" defTabSz="889000">
+          <a:pPr lvl="0" algn="ctr" defTabSz="889000">
             <a:lnSpc>
               <a:spcPct val="90000"/>
             </a:lnSpc>
@@ -1343,7 +1369,6 @@
             <a:spcAft>
               <a:spcPct val="35000"/>
             </a:spcAft>
-            <a:buNone/>
           </a:pPr>
           <a:r>
             <a:rPr lang="en-US" sz="2000" kern="1200" dirty="0"/>
@@ -1406,7 +1431,7 @@
         </a:bodyPr>
         <a:lstStyle/>
         <a:p>
-          <a:pPr marL="0" lvl="0" indent="0" algn="ctr" defTabSz="889000">
+          <a:pPr lvl="0" algn="ctr" defTabSz="889000">
             <a:lnSpc>
               <a:spcPct val="90000"/>
             </a:lnSpc>
@@ -1416,7 +1441,6 @@
             <a:spcAft>
               <a:spcPct val="35000"/>
             </a:spcAft>
-            <a:buNone/>
           </a:pPr>
           <a:r>
             <a:rPr lang="en-US" sz="2000" kern="1200" dirty="0"/>
@@ -2890,7 +2914,7 @@
           <a:p>
             <a:fld id="{64675A1E-7BBD-46EC-90C2-30E3B71B419A}" type="datetimeFigureOut">
               <a:rPr lang="es-MX" smtClean="0"/>
-              <a:t>06/03/2020</a:t>
+              <a:t>08/03/2020</a:t>
             </a:fld>
             <a:endParaRPr lang="es-MX"/>
           </a:p>
@@ -2942,7 +2966,7 @@
           <a:p>
             <a:fld id="{B0BF0F4E-8115-4019-94CC-FB96495A6C06}" type="slidenum">
               <a:rPr lang="es-MX" smtClean="0"/>
-              <a:t>‹#›</a:t>
+              <a:t>‹Nº›</a:t>
             </a:fld>
             <a:endParaRPr lang="es-MX"/>
           </a:p>
@@ -3101,7 +3125,7 @@
           <a:p>
             <a:fld id="{64675A1E-7BBD-46EC-90C2-30E3B71B419A}" type="datetimeFigureOut">
               <a:rPr lang="es-MX" smtClean="0"/>
-              <a:t>06/03/2020</a:t>
+              <a:t>08/03/2020</a:t>
             </a:fld>
             <a:endParaRPr lang="es-MX"/>
           </a:p>
@@ -3143,7 +3167,7 @@
           <a:p>
             <a:fld id="{B0BF0F4E-8115-4019-94CC-FB96495A6C06}" type="slidenum">
               <a:rPr lang="es-MX" smtClean="0"/>
-              <a:t>‹#›</a:t>
+              <a:t>‹Nº›</a:t>
             </a:fld>
             <a:endParaRPr lang="es-MX"/>
           </a:p>
@@ -3316,7 +3340,7 @@
           <a:p>
             <a:fld id="{64675A1E-7BBD-46EC-90C2-30E3B71B419A}" type="datetimeFigureOut">
               <a:rPr lang="es-MX" smtClean="0"/>
-              <a:t>06/03/2020</a:t>
+              <a:t>08/03/2020</a:t>
             </a:fld>
             <a:endParaRPr lang="es-MX"/>
           </a:p>
@@ -3358,7 +3382,7 @@
           <a:p>
             <a:fld id="{B0BF0F4E-8115-4019-94CC-FB96495A6C06}" type="slidenum">
               <a:rPr lang="es-MX" smtClean="0"/>
-              <a:t>‹#›</a:t>
+              <a:t>‹Nº›</a:t>
             </a:fld>
             <a:endParaRPr lang="es-MX"/>
           </a:p>
@@ -3517,7 +3541,7 @@
           <a:p>
             <a:fld id="{64675A1E-7BBD-46EC-90C2-30E3B71B419A}" type="datetimeFigureOut">
               <a:rPr lang="es-MX" smtClean="0"/>
-              <a:t>06/03/2020</a:t>
+              <a:t>08/03/2020</a:t>
             </a:fld>
             <a:endParaRPr lang="es-MX"/>
           </a:p>
@@ -3559,7 +3583,7 @@
           <a:p>
             <a:fld id="{B0BF0F4E-8115-4019-94CC-FB96495A6C06}" type="slidenum">
               <a:rPr lang="es-MX" smtClean="0"/>
-              <a:t>‹#›</a:t>
+              <a:t>‹Nº›</a:t>
             </a:fld>
             <a:endParaRPr lang="es-MX"/>
           </a:p>
@@ -3796,7 +3820,7 @@
           <a:p>
             <a:fld id="{64675A1E-7BBD-46EC-90C2-30E3B71B419A}" type="datetimeFigureOut">
               <a:rPr lang="es-MX" smtClean="0"/>
-              <a:t>06/03/2020</a:t>
+              <a:t>08/03/2020</a:t>
             </a:fld>
             <a:endParaRPr lang="es-MX"/>
           </a:p>
@@ -3838,7 +3862,7 @@
           <a:p>
             <a:fld id="{B0BF0F4E-8115-4019-94CC-FB96495A6C06}" type="slidenum">
               <a:rPr lang="es-MX" smtClean="0"/>
-              <a:t>‹#›</a:t>
+              <a:t>‹Nº›</a:t>
             </a:fld>
             <a:endParaRPr lang="es-MX"/>
           </a:p>
@@ -4064,7 +4088,7 @@
           <a:p>
             <a:fld id="{64675A1E-7BBD-46EC-90C2-30E3B71B419A}" type="datetimeFigureOut">
               <a:rPr lang="es-MX" smtClean="0"/>
-              <a:t>06/03/2020</a:t>
+              <a:t>08/03/2020</a:t>
             </a:fld>
             <a:endParaRPr lang="es-MX"/>
           </a:p>
@@ -4106,7 +4130,7 @@
           <a:p>
             <a:fld id="{B0BF0F4E-8115-4019-94CC-FB96495A6C06}" type="slidenum">
               <a:rPr lang="es-MX" smtClean="0"/>
-              <a:t>‹#›</a:t>
+              <a:t>‹Nº›</a:t>
             </a:fld>
             <a:endParaRPr lang="es-MX"/>
           </a:p>
@@ -4480,7 +4504,7 @@
           <a:p>
             <a:fld id="{64675A1E-7BBD-46EC-90C2-30E3B71B419A}" type="datetimeFigureOut">
               <a:rPr lang="es-MX" smtClean="0"/>
-              <a:t>06/03/2020</a:t>
+              <a:t>08/03/2020</a:t>
             </a:fld>
             <a:endParaRPr lang="es-MX"/>
           </a:p>
@@ -4522,7 +4546,7 @@
           <a:p>
             <a:fld id="{B0BF0F4E-8115-4019-94CC-FB96495A6C06}" type="slidenum">
               <a:rPr lang="es-MX" smtClean="0"/>
-              <a:t>‹#›</a:t>
+              <a:t>‹Nº›</a:t>
             </a:fld>
             <a:endParaRPr lang="es-MX"/>
           </a:p>
@@ -4629,7 +4653,7 @@
           <a:p>
             <a:fld id="{64675A1E-7BBD-46EC-90C2-30E3B71B419A}" type="datetimeFigureOut">
               <a:rPr lang="es-MX" smtClean="0"/>
-              <a:t>06/03/2020</a:t>
+              <a:t>08/03/2020</a:t>
             </a:fld>
             <a:endParaRPr lang="es-MX"/>
           </a:p>
@@ -4671,7 +4695,7 @@
           <a:p>
             <a:fld id="{B0BF0F4E-8115-4019-94CC-FB96495A6C06}" type="slidenum">
               <a:rPr lang="es-MX" smtClean="0"/>
-              <a:t>‹#›</a:t>
+              <a:t>‹Nº›</a:t>
             </a:fld>
             <a:endParaRPr lang="es-MX"/>
           </a:p>
@@ -4755,7 +4779,7 @@
           <a:p>
             <a:fld id="{64675A1E-7BBD-46EC-90C2-30E3B71B419A}" type="datetimeFigureOut">
               <a:rPr lang="es-MX" smtClean="0"/>
-              <a:t>06/03/2020</a:t>
+              <a:t>08/03/2020</a:t>
             </a:fld>
             <a:endParaRPr lang="es-MX"/>
           </a:p>
@@ -4797,7 +4821,7 @@
           <a:p>
             <a:fld id="{B0BF0F4E-8115-4019-94CC-FB96495A6C06}" type="slidenum">
               <a:rPr lang="es-MX" smtClean="0"/>
-              <a:t>‹#›</a:t>
+              <a:t>‹Nº›</a:t>
             </a:fld>
             <a:endParaRPr lang="es-MX"/>
           </a:p>
@@ -5006,7 +5030,7 @@
           <a:p>
             <a:fld id="{64675A1E-7BBD-46EC-90C2-30E3B71B419A}" type="datetimeFigureOut">
               <a:rPr lang="es-MX" smtClean="0"/>
-              <a:t>06/03/2020</a:t>
+              <a:t>08/03/2020</a:t>
             </a:fld>
             <a:endParaRPr lang="es-MX"/>
           </a:p>
@@ -5048,7 +5072,7 @@
           <a:p>
             <a:fld id="{B0BF0F4E-8115-4019-94CC-FB96495A6C06}" type="slidenum">
               <a:rPr lang="es-MX" smtClean="0"/>
-              <a:t>‹#›</a:t>
+              <a:t>‹Nº›</a:t>
             </a:fld>
             <a:endParaRPr lang="es-MX"/>
           </a:p>
@@ -5451,7 +5475,7 @@
           <a:p>
             <a:fld id="{64675A1E-7BBD-46EC-90C2-30E3B71B419A}" type="datetimeFigureOut">
               <a:rPr lang="es-MX" smtClean="0"/>
-              <a:t>06/03/2020</a:t>
+              <a:t>08/03/2020</a:t>
             </a:fld>
             <a:endParaRPr lang="es-MX"/>
           </a:p>
@@ -5498,7 +5522,7 @@
           <a:p>
             <a:fld id="{B0BF0F4E-8115-4019-94CC-FB96495A6C06}" type="slidenum">
               <a:rPr lang="es-MX" smtClean="0"/>
-              <a:t>‹#›</a:t>
+              <a:t>‹Nº›</a:t>
             </a:fld>
             <a:endParaRPr lang="es-MX"/>
           </a:p>
@@ -5778,7 +5802,7 @@
           <a:p>
             <a:fld id="{64675A1E-7BBD-46EC-90C2-30E3B71B419A}" type="datetimeFigureOut">
               <a:rPr lang="es-MX" smtClean="0"/>
-              <a:t>06/03/2020</a:t>
+              <a:t>08/03/2020</a:t>
             </a:fld>
             <a:endParaRPr lang="es-MX"/>
           </a:p>
@@ -5854,7 +5878,7 @@
           <a:p>
             <a:fld id="{B0BF0F4E-8115-4019-94CC-FB96495A6C06}" type="slidenum">
               <a:rPr lang="es-MX" smtClean="0"/>
-              <a:t>‹#›</a:t>
+              <a:t>‹Nº›</a:t>
             </a:fld>
             <a:endParaRPr lang="es-MX"/>
           </a:p>
@@ -6269,7 +6293,7 @@
           <p:cNvPr id="2" name="Title 1">
             <a:extLst>
               <a:ext uri="{FF2B5EF4-FFF2-40B4-BE49-F238E27FC236}">
-                <a16:creationId xmlns:a16="http://schemas.microsoft.com/office/drawing/2014/main" id="{32D5BD50-28EC-43B5-839F-B9E51F44CFB4}"/>
+                <a16:creationId xmlns:a16="http://schemas.microsoft.com/office/drawing/2014/main" xmlns="" id="{32D5BD50-28EC-43B5-839F-B9E51F44CFB4}"/>
               </a:ext>
             </a:extLst>
           </p:cNvPr>
@@ -6283,7 +6307,7 @@
         <p:spPr/>
         <p:txBody>
           <a:bodyPr>
-            <a:normAutofit fontScale="90000"/>
+            <a:normAutofit/>
           </a:bodyPr>
           <a:lstStyle/>
           <a:p>
@@ -6307,7 +6331,7 @@
           <p:cNvPr id="3" name="Subtitle 2">
             <a:extLst>
               <a:ext uri="{FF2B5EF4-FFF2-40B4-BE49-F238E27FC236}">
-                <a16:creationId xmlns:a16="http://schemas.microsoft.com/office/drawing/2014/main" id="{74F90FDB-688B-4608-BE91-19666CC84DA5}"/>
+                <a16:creationId xmlns:a16="http://schemas.microsoft.com/office/drawing/2014/main" xmlns="" id="{74F90FDB-688B-4608-BE91-19666CC84DA5}"/>
               </a:ext>
             </a:extLst>
           </p:cNvPr>
@@ -6366,7 +6390,7 @@
           <p:cNvPr id="2" name="Title 1">
             <a:extLst>
               <a:ext uri="{FF2B5EF4-FFF2-40B4-BE49-F238E27FC236}">
-                <a16:creationId xmlns:a16="http://schemas.microsoft.com/office/drawing/2014/main" id="{4A494A44-DE60-4B09-ABB9-555A09589F7A}"/>
+                <a16:creationId xmlns:a16="http://schemas.microsoft.com/office/drawing/2014/main" xmlns="" id="{4A494A44-DE60-4B09-ABB9-555A09589F7A}"/>
               </a:ext>
             </a:extLst>
           </p:cNvPr>
@@ -6391,7 +6415,7 @@
           <p:cNvPr id="3" name="Content Placeholder 2">
             <a:extLst>
               <a:ext uri="{FF2B5EF4-FFF2-40B4-BE49-F238E27FC236}">
-                <a16:creationId xmlns:a16="http://schemas.microsoft.com/office/drawing/2014/main" id="{07C6715C-9AAD-4835-9F7F-B96BD9D2E587}"/>
+                <a16:creationId xmlns:a16="http://schemas.microsoft.com/office/drawing/2014/main" xmlns="" id="{07C6715C-9AAD-4835-9F7F-B96BD9D2E587}"/>
               </a:ext>
             </a:extLst>
           </p:cNvPr>
@@ -6446,7 +6470,7 @@
           <p:cNvPr id="4" name="Title 3">
             <a:extLst>
               <a:ext uri="{FF2B5EF4-FFF2-40B4-BE49-F238E27FC236}">
-                <a16:creationId xmlns:a16="http://schemas.microsoft.com/office/drawing/2014/main" id="{AF3DC2BF-6F4A-4835-8BD4-F82ED901BBF8}"/>
+                <a16:creationId xmlns:a16="http://schemas.microsoft.com/office/drawing/2014/main" xmlns="" id="{AF3DC2BF-6F4A-4835-8BD4-F82ED901BBF8}"/>
               </a:ext>
             </a:extLst>
           </p:cNvPr>
@@ -6475,7 +6499,7 @@
           <p:cNvPr id="5" name="Text Placeholder 4">
             <a:extLst>
               <a:ext uri="{FF2B5EF4-FFF2-40B4-BE49-F238E27FC236}">
-                <a16:creationId xmlns:a16="http://schemas.microsoft.com/office/drawing/2014/main" id="{D7C89B07-BA56-4773-86E8-62EAC8D55105}"/>
+                <a16:creationId xmlns:a16="http://schemas.microsoft.com/office/drawing/2014/main" xmlns="" id="{D7C89B07-BA56-4773-86E8-62EAC8D55105}"/>
               </a:ext>
             </a:extLst>
           </p:cNvPr>
@@ -6537,7 +6561,7 @@
           <p:cNvPr id="4" name="Title 3">
             <a:extLst>
               <a:ext uri="{FF2B5EF4-FFF2-40B4-BE49-F238E27FC236}">
-                <a16:creationId xmlns:a16="http://schemas.microsoft.com/office/drawing/2014/main" id="{CFF994D8-FB70-4763-BB9C-6FD758911643}"/>
+                <a16:creationId xmlns:a16="http://schemas.microsoft.com/office/drawing/2014/main" xmlns="" id="{CFF994D8-FB70-4763-BB9C-6FD758911643}"/>
               </a:ext>
             </a:extLst>
           </p:cNvPr>
@@ -6566,7 +6590,7 @@
           <p:cNvPr id="5" name="Content Placeholder 4">
             <a:extLst>
               <a:ext uri="{FF2B5EF4-FFF2-40B4-BE49-F238E27FC236}">
-                <a16:creationId xmlns:a16="http://schemas.microsoft.com/office/drawing/2014/main" id="{C66C483F-D584-41DD-8A46-AA99346824D9}"/>
+                <a16:creationId xmlns:a16="http://schemas.microsoft.com/office/drawing/2014/main" xmlns="" id="{C66C483F-D584-41DD-8A46-AA99346824D9}"/>
               </a:ext>
             </a:extLst>
           </p:cNvPr>
@@ -6616,7 +6640,7 @@
           <p:cNvPr id="6" name="Diagram 5">
             <a:extLst>
               <a:ext uri="{FF2B5EF4-FFF2-40B4-BE49-F238E27FC236}">
-                <a16:creationId xmlns:a16="http://schemas.microsoft.com/office/drawing/2014/main" id="{C35826DC-EE5C-42A1-B251-BD772857E9CE}"/>
+                <a16:creationId xmlns:a16="http://schemas.microsoft.com/office/drawing/2014/main" xmlns="" id="{C35826DC-EE5C-42A1-B251-BD772857E9CE}"/>
               </a:ext>
             </a:extLst>
           </p:cNvPr>
@@ -6674,7 +6698,7 @@
           <p:cNvPr id="2" name="Title 1">
             <a:extLst>
               <a:ext uri="{FF2B5EF4-FFF2-40B4-BE49-F238E27FC236}">
-                <a16:creationId xmlns:a16="http://schemas.microsoft.com/office/drawing/2014/main" id="{5E2D21CF-C427-4A1E-B419-4A0C7ACE469C}"/>
+                <a16:creationId xmlns:a16="http://schemas.microsoft.com/office/drawing/2014/main" xmlns="" id="{5E2D21CF-C427-4A1E-B419-4A0C7ACE469C}"/>
               </a:ext>
             </a:extLst>
           </p:cNvPr>
@@ -6692,9 +6716,20 @@
           <a:p>
             <a:r>
               <a:rPr lang="en-US" dirty="0"/>
-              <a:t>A/B Testing</a:t>
-            </a:r>
-            <a:endParaRPr lang="es-MX" dirty="0"/>
+              <a:t>A/B </a:t>
+            </a:r>
+            <a:r>
+              <a:rPr lang="en-US" dirty="0" smtClean="0"/>
+              <a:t>Testing </a:t>
+            </a:r>
+            <a:br>
+              <a:rPr lang="en-US" dirty="0" smtClean="0"/>
+            </a:br>
+            <a:r>
+              <a:rPr lang="en-US" sz="2400" dirty="0" smtClean="0"/>
+              <a:t>Key terms</a:t>
+            </a:r>
+            <a:endParaRPr lang="es-MX" sz="2400" dirty="0"/>
           </a:p>
         </p:txBody>
       </p:sp>
@@ -6703,7 +6738,7 @@
           <p:cNvPr id="3" name="Content Placeholder 2">
             <a:extLst>
               <a:ext uri="{FF2B5EF4-FFF2-40B4-BE49-F238E27FC236}">
-                <a16:creationId xmlns:a16="http://schemas.microsoft.com/office/drawing/2014/main" id="{E1EA1F81-F8CC-4F09-B395-E2D4579A607F}"/>
+                <a16:creationId xmlns:a16="http://schemas.microsoft.com/office/drawing/2014/main" xmlns="" id="{E1EA1F81-F8CC-4F09-B395-E2D4579A607F}"/>
               </a:ext>
             </a:extLst>
           </p:cNvPr>
@@ -6824,7 +6859,7 @@
           <p:cNvPr id="2" name="Title 1">
             <a:extLst>
               <a:ext uri="{FF2B5EF4-FFF2-40B4-BE49-F238E27FC236}">
-                <a16:creationId xmlns:a16="http://schemas.microsoft.com/office/drawing/2014/main" id="{108756E7-06FF-412F-AEFD-F5148E35106F}"/>
+                <a16:creationId xmlns:a16="http://schemas.microsoft.com/office/drawing/2014/main" xmlns="" id="{108756E7-06FF-412F-AEFD-F5148E35106F}"/>
               </a:ext>
             </a:extLst>
           </p:cNvPr>
@@ -6842,9 +6877,20 @@
           <a:p>
             <a:r>
               <a:rPr lang="en-US" dirty="0"/>
-              <a:t>A/B testing examples</a:t>
-            </a:r>
-            <a:endParaRPr lang="es-MX" dirty="0"/>
+              <a:t>A/B </a:t>
+            </a:r>
+            <a:r>
+              <a:rPr lang="en-US" dirty="0" smtClean="0"/>
+              <a:t>testing</a:t>
+            </a:r>
+            <a:br>
+              <a:rPr lang="en-US" dirty="0" smtClean="0"/>
+            </a:br>
+            <a:r>
+              <a:rPr lang="en-US" sz="2400" dirty="0" smtClean="0"/>
+              <a:t>examples</a:t>
+            </a:r>
+            <a:endParaRPr lang="es-MX" sz="2400" dirty="0"/>
           </a:p>
         </p:txBody>
       </p:sp>
@@ -6853,7 +6899,7 @@
           <p:cNvPr id="3" name="Content Placeholder 2">
             <a:extLst>
               <a:ext uri="{FF2B5EF4-FFF2-40B4-BE49-F238E27FC236}">
-                <a16:creationId xmlns:a16="http://schemas.microsoft.com/office/drawing/2014/main" id="{0D3E1BDB-8601-4CEB-8F22-A92206DC8224}"/>
+                <a16:creationId xmlns:a16="http://schemas.microsoft.com/office/drawing/2014/main" xmlns="" id="{0D3E1BDB-8601-4CEB-8F22-A92206DC8224}"/>
               </a:ext>
             </a:extLst>
           </p:cNvPr>
@@ -6936,7 +6982,7 @@
           <p:cNvPr id="2" name="Title 1">
             <a:extLst>
               <a:ext uri="{FF2B5EF4-FFF2-40B4-BE49-F238E27FC236}">
-                <a16:creationId xmlns:a16="http://schemas.microsoft.com/office/drawing/2014/main" id="{D45D6B12-E728-43A9-805D-6A4641E2F4F0}"/>
+                <a16:creationId xmlns:a16="http://schemas.microsoft.com/office/drawing/2014/main" xmlns="" id="{D45D6B12-E728-43A9-805D-6A4641E2F4F0}"/>
               </a:ext>
             </a:extLst>
           </p:cNvPr>
@@ -6954,7 +7000,11 @@
           <a:p>
             <a:r>
               <a:rPr lang="en-US" dirty="0"/>
-              <a:t>A/B Test</a:t>
+              <a:t>A/B </a:t>
+            </a:r>
+            <a:r>
+              <a:rPr lang="en-US" dirty="0" smtClean="0"/>
+              <a:t>Testing</a:t>
             </a:r>
             <a:endParaRPr lang="es-MX" dirty="0"/>
           </a:p>
@@ -6965,7 +7015,7 @@
           <p:cNvPr id="3" name="Content Placeholder 2">
             <a:extLst>
               <a:ext uri="{FF2B5EF4-FFF2-40B4-BE49-F238E27FC236}">
-                <a16:creationId xmlns:a16="http://schemas.microsoft.com/office/drawing/2014/main" id="{DB5BC476-34BC-421E-80A9-B1324F89C578}"/>
+                <a16:creationId xmlns:a16="http://schemas.microsoft.com/office/drawing/2014/main" xmlns="" id="{DB5BC476-34BC-421E-80A9-B1324F89C578}"/>
               </a:ext>
             </a:extLst>
           </p:cNvPr>
@@ -7061,7 +7111,7 @@
           <p:cNvPr id="2" name="Title 1">
             <a:extLst>
               <a:ext uri="{FF2B5EF4-FFF2-40B4-BE49-F238E27FC236}">
-                <a16:creationId xmlns:a16="http://schemas.microsoft.com/office/drawing/2014/main" id="{A83928E8-A2A4-4A62-822F-3A9262A704F2}"/>
+                <a16:creationId xmlns:a16="http://schemas.microsoft.com/office/drawing/2014/main" xmlns="" id="{A83928E8-A2A4-4A62-822F-3A9262A704F2}"/>
               </a:ext>
             </a:extLst>
           </p:cNvPr>
@@ -7090,7 +7140,7 @@
           <p:cNvPr id="3" name="Content Placeholder 2">
             <a:extLst>
               <a:ext uri="{FF2B5EF4-FFF2-40B4-BE49-F238E27FC236}">
-                <a16:creationId xmlns:a16="http://schemas.microsoft.com/office/drawing/2014/main" id="{0D3C7310-FF92-4000-839F-E0F06739401D}"/>
+                <a16:creationId xmlns:a16="http://schemas.microsoft.com/office/drawing/2014/main" xmlns="" id="{0D3C7310-FF92-4000-839F-E0F06739401D}"/>
               </a:ext>
             </a:extLst>
           </p:cNvPr>
@@ -7166,7 +7216,7 @@
           <p:cNvPr id="2" name="Title 1">
             <a:extLst>
               <a:ext uri="{FF2B5EF4-FFF2-40B4-BE49-F238E27FC236}">
-                <a16:creationId xmlns:a16="http://schemas.microsoft.com/office/drawing/2014/main" id="{24A04E48-292D-432F-AD8E-62895E19AF4B}"/>
+                <a16:creationId xmlns:a16="http://schemas.microsoft.com/office/drawing/2014/main" xmlns="" id="{24A04E48-292D-432F-AD8E-62895E19AF4B}"/>
               </a:ext>
             </a:extLst>
           </p:cNvPr>
@@ -7182,7 +7232,11 @@
           <a:bodyPr/>
           <a:lstStyle/>
           <a:p>
-            <a:endParaRPr lang="es-MX"/>
+            <a:r>
+              <a:rPr lang="en-US" dirty="0"/>
+              <a:t>A/B testing</a:t>
+            </a:r>
+            <a:endParaRPr lang="es-MX" dirty="0"/>
           </a:p>
         </p:txBody>
       </p:sp>
@@ -7191,7 +7245,7 @@
           <p:cNvPr id="3" name="Content Placeholder 2">
             <a:extLst>
               <a:ext uri="{FF2B5EF4-FFF2-40B4-BE49-F238E27FC236}">
-                <a16:creationId xmlns:a16="http://schemas.microsoft.com/office/drawing/2014/main" id="{41BFF8EA-7B29-4F21-A958-AE02B7BEC4A5}"/>
+                <a16:creationId xmlns:a16="http://schemas.microsoft.com/office/drawing/2014/main" xmlns="" id="{41BFF8EA-7B29-4F21-A958-AE02B7BEC4A5}"/>
               </a:ext>
             </a:extLst>
           </p:cNvPr>
@@ -7205,7 +7259,7 @@
         <p:spPr/>
         <p:txBody>
           <a:bodyPr>
-            <a:normAutofit fontScale="92500" lnSpcReduction="20000"/>
+            <a:normAutofit fontScale="85000" lnSpcReduction="10000"/>
           </a:bodyPr>
           <a:lstStyle/>
           <a:p>
@@ -7298,7 +7352,7 @@
           <p:cNvPr id="2" name="Title 1">
             <a:extLst>
               <a:ext uri="{FF2B5EF4-FFF2-40B4-BE49-F238E27FC236}">
-                <a16:creationId xmlns:a16="http://schemas.microsoft.com/office/drawing/2014/main" id="{F3538E31-242C-4FB6-93A1-D2FFE0607903}"/>
+                <a16:creationId xmlns:a16="http://schemas.microsoft.com/office/drawing/2014/main" xmlns="" id="{F3538E31-242C-4FB6-93A1-D2FFE0607903}"/>
               </a:ext>
             </a:extLst>
           </p:cNvPr>
@@ -7316,9 +7370,20 @@
           <a:p>
             <a:r>
               <a:rPr lang="en-US" dirty="0"/>
-              <a:t>Hypothesis test</a:t>
-            </a:r>
-            <a:endParaRPr lang="es-MX" dirty="0"/>
+              <a:t>Hypothesis </a:t>
+            </a:r>
+            <a:r>
+              <a:rPr lang="en-US" dirty="0" smtClean="0"/>
+              <a:t>test</a:t>
+            </a:r>
+            <a:br>
+              <a:rPr lang="en-US" dirty="0" smtClean="0"/>
+            </a:br>
+            <a:r>
+              <a:rPr lang="en-US" sz="2400" dirty="0" smtClean="0"/>
+              <a:t>key terms</a:t>
+            </a:r>
+            <a:endParaRPr lang="es-MX" sz="2400" dirty="0"/>
           </a:p>
         </p:txBody>
       </p:sp>
@@ -7327,7 +7392,7 @@
           <p:cNvPr id="3" name="Content Placeholder 2">
             <a:extLst>
               <a:ext uri="{FF2B5EF4-FFF2-40B4-BE49-F238E27FC236}">
-                <a16:creationId xmlns:a16="http://schemas.microsoft.com/office/drawing/2014/main" id="{1691AE57-8F9D-4056-922C-9AF849E9E28D}"/>
+                <a16:creationId xmlns:a16="http://schemas.microsoft.com/office/drawing/2014/main" xmlns="" id="{1691AE57-8F9D-4056-922C-9AF849E9E28D}"/>
               </a:ext>
             </a:extLst>
           </p:cNvPr>

</xml_diff>